<commit_message>
2_css adding assets and fixing powerpoint anims
</commit_message>
<xml_diff>
--- a/2_css/diapo/schemas.pptx
+++ b/2_css/diapo/schemas.pptx
@@ -294,7 +294,7 @@
             <a:fld id="{20D8AF31-5A60-42A3-B2D4-C2A17D35ED29}" type="datetimeFigureOut">
               <a:rPr lang="en-US" smtClean="0"/>
               <a:pPr/>
-              <a:t>4/20/2020</a:t>
+              <a:t>4/21/2020</a:t>
             </a:fld>
             <a:endParaRPr lang="en-US"/>
           </a:p>
@@ -462,7 +462,7 @@
             <a:fld id="{20D8AF31-5A60-42A3-B2D4-C2A17D35ED29}" type="datetimeFigureOut">
               <a:rPr lang="en-US" smtClean="0"/>
               <a:pPr/>
-              <a:t>4/20/2020</a:t>
+              <a:t>4/21/2020</a:t>
             </a:fld>
             <a:endParaRPr lang="en-US"/>
           </a:p>
@@ -640,7 +640,7 @@
             <a:fld id="{20D8AF31-5A60-42A3-B2D4-C2A17D35ED29}" type="datetimeFigureOut">
               <a:rPr lang="en-US" smtClean="0"/>
               <a:pPr/>
-              <a:t>4/20/2020</a:t>
+              <a:t>4/21/2020</a:t>
             </a:fld>
             <a:endParaRPr lang="en-US"/>
           </a:p>
@@ -808,7 +808,7 @@
             <a:fld id="{20D8AF31-5A60-42A3-B2D4-C2A17D35ED29}" type="datetimeFigureOut">
               <a:rPr lang="en-US" smtClean="0"/>
               <a:pPr/>
-              <a:t>4/20/2020</a:t>
+              <a:t>4/21/2020</a:t>
             </a:fld>
             <a:endParaRPr lang="en-US"/>
           </a:p>
@@ -1052,7 +1052,7 @@
             <a:fld id="{20D8AF31-5A60-42A3-B2D4-C2A17D35ED29}" type="datetimeFigureOut">
               <a:rPr lang="en-US" smtClean="0"/>
               <a:pPr/>
-              <a:t>4/20/2020</a:t>
+              <a:t>4/21/2020</a:t>
             </a:fld>
             <a:endParaRPr lang="en-US"/>
           </a:p>
@@ -1338,7 +1338,7 @@
             <a:fld id="{20D8AF31-5A60-42A3-B2D4-C2A17D35ED29}" type="datetimeFigureOut">
               <a:rPr lang="en-US" smtClean="0"/>
               <a:pPr/>
-              <a:t>4/20/2020</a:t>
+              <a:t>4/21/2020</a:t>
             </a:fld>
             <a:endParaRPr lang="en-US"/>
           </a:p>
@@ -1758,7 +1758,7 @@
             <a:fld id="{20D8AF31-5A60-42A3-B2D4-C2A17D35ED29}" type="datetimeFigureOut">
               <a:rPr lang="en-US" smtClean="0"/>
               <a:pPr/>
-              <a:t>4/20/2020</a:t>
+              <a:t>4/21/2020</a:t>
             </a:fld>
             <a:endParaRPr lang="en-US"/>
           </a:p>
@@ -1874,7 +1874,7 @@
             <a:fld id="{20D8AF31-5A60-42A3-B2D4-C2A17D35ED29}" type="datetimeFigureOut">
               <a:rPr lang="en-US" smtClean="0"/>
               <a:pPr/>
-              <a:t>4/20/2020</a:t>
+              <a:t>4/21/2020</a:t>
             </a:fld>
             <a:endParaRPr lang="en-US"/>
           </a:p>
@@ -1967,7 +1967,7 @@
             <a:fld id="{20D8AF31-5A60-42A3-B2D4-C2A17D35ED29}" type="datetimeFigureOut">
               <a:rPr lang="en-US" smtClean="0"/>
               <a:pPr/>
-              <a:t>4/20/2020</a:t>
+              <a:t>4/21/2020</a:t>
             </a:fld>
             <a:endParaRPr lang="en-US"/>
           </a:p>
@@ -2242,7 +2242,7 @@
             <a:fld id="{20D8AF31-5A60-42A3-B2D4-C2A17D35ED29}" type="datetimeFigureOut">
               <a:rPr lang="en-US" smtClean="0"/>
               <a:pPr/>
-              <a:t>4/20/2020</a:t>
+              <a:t>4/21/2020</a:t>
             </a:fld>
             <a:endParaRPr lang="en-US"/>
           </a:p>
@@ -2493,7 +2493,7 @@
             <a:fld id="{20D8AF31-5A60-42A3-B2D4-C2A17D35ED29}" type="datetimeFigureOut">
               <a:rPr lang="en-US" smtClean="0"/>
               <a:pPr/>
-              <a:t>4/20/2020</a:t>
+              <a:t>4/21/2020</a:t>
             </a:fld>
             <a:endParaRPr lang="en-US"/>
           </a:p>
@@ -2710,7 +2710,7 @@
             <a:fld id="{20D8AF31-5A60-42A3-B2D4-C2A17D35ED29}" type="datetimeFigureOut">
               <a:rPr lang="en-US" smtClean="0"/>
               <a:pPr/>
-              <a:t>4/20/2020</a:t>
+              <a:t>4/21/2020</a:t>
             </a:fld>
             <a:endParaRPr lang="en-US"/>
           </a:p>
@@ -4446,6 +4446,94 @@
                       </p:childTnLst>
                     </p:cTn>
                   </p:par>
+                  <p:par>
+                    <p:cTn id="27" fill="hold">
+                      <p:stCondLst>
+                        <p:cond delay="indefinite"/>
+                      </p:stCondLst>
+                      <p:childTnLst>
+                        <p:par>
+                          <p:cTn id="28" fill="hold">
+                            <p:stCondLst>
+                              <p:cond delay="0"/>
+                            </p:stCondLst>
+                            <p:childTnLst>
+                              <p:par>
+                                <p:cTn id="29" presetID="10" presetClass="entr" presetSubtype="0" fill="hold" nodeType="clickEffect">
+                                  <p:stCondLst>
+                                    <p:cond delay="0"/>
+                                  </p:stCondLst>
+                                  <p:childTnLst>
+                                    <p:set>
+                                      <p:cBhvr>
+                                        <p:cTn id="30" dur="1" fill="hold">
+                                          <p:stCondLst>
+                                            <p:cond delay="0"/>
+                                          </p:stCondLst>
+                                        </p:cTn>
+                                        <p:tgtEl>
+                                          <p:spTgt spid="2055"/>
+                                        </p:tgtEl>
+                                        <p:attrNameLst>
+                                          <p:attrName>style.visibility</p:attrName>
+                                        </p:attrNameLst>
+                                      </p:cBhvr>
+                                      <p:to>
+                                        <p:strVal val="visible"/>
+                                      </p:to>
+                                    </p:set>
+                                    <p:animEffect transition="in" filter="fade">
+                                      <p:cBhvr>
+                                        <p:cTn id="31" dur="500"/>
+                                        <p:tgtEl>
+                                          <p:spTgt spid="2055"/>
+                                        </p:tgtEl>
+                                      </p:cBhvr>
+                                    </p:animEffect>
+                                  </p:childTnLst>
+                                </p:cTn>
+                              </p:par>
+                              <p:par>
+                                <p:cTn id="32" presetID="10" presetClass="entr" presetSubtype="0" fill="hold" grpId="0" nodeType="withEffect">
+                                  <p:stCondLst>
+                                    <p:cond delay="0"/>
+                                  </p:stCondLst>
+                                  <p:childTnLst>
+                                    <p:set>
+                                      <p:cBhvr>
+                                        <p:cTn id="33" dur="1" fill="hold">
+                                          <p:stCondLst>
+                                            <p:cond delay="0"/>
+                                          </p:stCondLst>
+                                        </p:cTn>
+                                        <p:tgtEl>
+                                          <p:spTgt spid="19"/>
+                                        </p:tgtEl>
+                                        <p:attrNameLst>
+                                          <p:attrName>style.visibility</p:attrName>
+                                        </p:attrNameLst>
+                                      </p:cBhvr>
+                                      <p:to>
+                                        <p:strVal val="visible"/>
+                                      </p:to>
+                                    </p:set>
+                                    <p:animEffect transition="in" filter="fade">
+                                      <p:cBhvr>
+                                        <p:cTn id="34" dur="500"/>
+                                        <p:tgtEl>
+                                          <p:spTgt spid="19"/>
+                                        </p:tgtEl>
+                                      </p:cBhvr>
+                                    </p:animEffect>
+                                  </p:childTnLst>
+                                </p:cTn>
+                              </p:par>
+                            </p:childTnLst>
+                          </p:cTn>
+                        </p:par>
+                      </p:childTnLst>
+                    </p:cTn>
+                  </p:par>
                 </p:childTnLst>
               </p:cTn>
               <p:prevCondLst>
@@ -4471,6 +4559,7 @@
       <p:bldP spid="13" grpId="0"/>
       <p:bldP spid="14" grpId="0"/>
       <p:bldP spid="17" grpId="0"/>
+      <p:bldP spid="19" grpId="0"/>
     </p:bldLst>
   </p:timing>
 </p:sld>
@@ -6304,7 +6393,7 @@
                                           </p:stCondLst>
                                         </p:cTn>
                                         <p:tgtEl>
-                                          <p:spTgt spid="13"/>
+                                          <p:spTgt spid="15"/>
                                         </p:tgtEl>
                                         <p:attrNameLst>
                                           <p:attrName>style.visibility</p:attrName>
@@ -6318,7 +6407,7 @@
                                       <p:cBhvr>
                                         <p:cTn id="7" dur="500"/>
                                         <p:tgtEl>
-                                          <p:spTgt spid="13"/>
+                                          <p:spTgt spid="15"/>
                                         </p:tgtEl>
                                       </p:cBhvr>
                                     </p:animEffect>
@@ -6339,7 +6428,7 @@
                                           </p:stCondLst>
                                         </p:cTn>
                                         <p:tgtEl>
-                                          <p:spTgt spid="14"/>
+                                          <p:spTgt spid="13"/>
                                         </p:tgtEl>
                                         <p:attrNameLst>
                                           <p:attrName>style.visibility</p:attrName>
@@ -6353,7 +6442,7 @@
                                       <p:cBhvr>
                                         <p:cTn id="10" dur="500"/>
                                         <p:tgtEl>
-                                          <p:spTgt spid="14"/>
+                                          <p:spTgt spid="13"/>
                                         </p:tgtEl>
                                       </p:cBhvr>
                                     </p:animEffect>
@@ -6374,7 +6463,7 @@
                                           </p:stCondLst>
                                         </p:cTn>
                                         <p:tgtEl>
-                                          <p:spTgt spid="11"/>
+                                          <p:spTgt spid="14"/>
                                         </p:tgtEl>
                                         <p:attrNameLst>
                                           <p:attrName>style.visibility</p:attrName>
@@ -6388,7 +6477,7 @@
                                       <p:cBhvr>
                                         <p:cTn id="13" dur="500"/>
                                         <p:tgtEl>
-                                          <p:spTgt spid="11"/>
+                                          <p:spTgt spid="14"/>
                                         </p:tgtEl>
                                       </p:cBhvr>
                                     </p:animEffect>
@@ -6396,7 +6485,7 @@
                                 </p:cTn>
                               </p:par>
                               <p:par>
-                                <p:cTn id="14" presetID="10" presetClass="entr" presetSubtype="0" fill="hold" nodeType="withEffect">
+                                <p:cTn id="14" presetID="10" presetClass="entr" presetSubtype="0" fill="hold" grpId="0" nodeType="withEffect">
                                   <p:stCondLst>
                                     <p:cond delay="0"/>
                                   </p:stCondLst>
@@ -6409,7 +6498,7 @@
                                           </p:stCondLst>
                                         </p:cTn>
                                         <p:tgtEl>
-                                          <p:spTgt spid="5122"/>
+                                          <p:spTgt spid="11"/>
                                         </p:tgtEl>
                                         <p:attrNameLst>
                                           <p:attrName>style.visibility</p:attrName>
@@ -6423,7 +6512,7 @@
                                       <p:cBhvr>
                                         <p:cTn id="16" dur="500"/>
                                         <p:tgtEl>
-                                          <p:spTgt spid="5122"/>
+                                          <p:spTgt spid="11"/>
                                         </p:tgtEl>
                                       </p:cBhvr>
                                     </p:animEffect>
@@ -6444,7 +6533,7 @@
                                           </p:stCondLst>
                                         </p:cTn>
                                         <p:tgtEl>
-                                          <p:spTgt spid="5123"/>
+                                          <p:spTgt spid="5122"/>
                                         </p:tgtEl>
                                         <p:attrNameLst>
                                           <p:attrName>style.visibility</p:attrName>
@@ -6458,7 +6547,7 @@
                                       <p:cBhvr>
                                         <p:cTn id="19" dur="500"/>
                                         <p:tgtEl>
-                                          <p:spTgt spid="5123"/>
+                                          <p:spTgt spid="5122"/>
                                         </p:tgtEl>
                                       </p:cBhvr>
                                     </p:animEffect>
@@ -6466,7 +6555,7 @@
                                 </p:cTn>
                               </p:par>
                               <p:par>
-                                <p:cTn id="20" presetID="10" presetClass="entr" presetSubtype="0" fill="hold" grpId="0" nodeType="withEffect">
+                                <p:cTn id="20" presetID="10" presetClass="entr" presetSubtype="0" fill="hold" nodeType="withEffect">
                                   <p:stCondLst>
                                     <p:cond delay="0"/>
                                   </p:stCondLst>
@@ -6479,7 +6568,7 @@
                                           </p:stCondLst>
                                         </p:cTn>
                                         <p:tgtEl>
-                                          <p:spTgt spid="15"/>
+                                          <p:spTgt spid="5123"/>
                                         </p:tgtEl>
                                         <p:attrNameLst>
                                           <p:attrName>style.visibility</p:attrName>
@@ -6493,7 +6582,7 @@
                                       <p:cBhvr>
                                         <p:cTn id="22" dur="500"/>
                                         <p:tgtEl>
-                                          <p:spTgt spid="15"/>
+                                          <p:spTgt spid="5123"/>
                                         </p:tgtEl>
                                       </p:cBhvr>
                                     </p:animEffect>
@@ -6532,7 +6621,11 @@
                                           </p:stCondLst>
                                         </p:cTn>
                                         <p:tgtEl>
-                                          <p:spTgt spid="23"/>
+                                          <p:spTgt spid="17">
+                                            <p:txEl>
+                                              <p:pRg st="0" end="0"/>
+                                            </p:txEl>
+                                          </p:spTgt>
                                         </p:tgtEl>
                                         <p:attrNameLst>
                                           <p:attrName>style.visibility</p:attrName>
@@ -6546,7 +6639,11 @@
                                       <p:cBhvr>
                                         <p:cTn id="27" dur="500"/>
                                         <p:tgtEl>
-                                          <p:spTgt spid="23"/>
+                                          <p:spTgt spid="17">
+                                            <p:txEl>
+                                              <p:pRg st="0" end="0"/>
+                                            </p:txEl>
+                                          </p:spTgt>
                                         </p:tgtEl>
                                       </p:cBhvr>
                                     </p:animEffect>
@@ -6567,7 +6664,7 @@
                                           </p:stCondLst>
                                         </p:cTn>
                                         <p:tgtEl>
-                                          <p:spTgt spid="22"/>
+                                          <p:spTgt spid="23"/>
                                         </p:tgtEl>
                                         <p:attrNameLst>
                                           <p:attrName>style.visibility</p:attrName>
@@ -6581,7 +6678,7 @@
                                       <p:cBhvr>
                                         <p:cTn id="30" dur="500"/>
                                         <p:tgtEl>
-                                          <p:spTgt spid="22"/>
+                                          <p:spTgt spid="23"/>
                                         </p:tgtEl>
                                       </p:cBhvr>
                                     </p:animEffect>
@@ -6602,7 +6699,7 @@
                                           </p:stCondLst>
                                         </p:cTn>
                                         <p:tgtEl>
-                                          <p:spTgt spid="21"/>
+                                          <p:spTgt spid="22"/>
                                         </p:tgtEl>
                                         <p:attrNameLst>
                                           <p:attrName>style.visibility</p:attrName>
@@ -6616,7 +6713,7 @@
                                       <p:cBhvr>
                                         <p:cTn id="33" dur="500"/>
                                         <p:tgtEl>
-                                          <p:spTgt spid="21"/>
+                                          <p:spTgt spid="22"/>
                                         </p:tgtEl>
                                       </p:cBhvr>
                                     </p:animEffect>
@@ -6624,7 +6721,7 @@
                                 </p:cTn>
                               </p:par>
                               <p:par>
-                                <p:cTn id="34" presetID="10" presetClass="entr" presetSubtype="0" fill="hold" nodeType="withEffect">
+                                <p:cTn id="34" presetID="10" presetClass="entr" presetSubtype="0" fill="hold" grpId="0" nodeType="withEffect">
                                   <p:stCondLst>
                                     <p:cond delay="0"/>
                                   </p:stCondLst>
@@ -6637,7 +6734,7 @@
                                           </p:stCondLst>
                                         </p:cTn>
                                         <p:tgtEl>
-                                          <p:spTgt spid="19"/>
+                                          <p:spTgt spid="21"/>
                                         </p:tgtEl>
                                         <p:attrNameLst>
                                           <p:attrName>style.visibility</p:attrName>
@@ -6651,7 +6748,7 @@
                                       <p:cBhvr>
                                         <p:cTn id="36" dur="500"/>
                                         <p:tgtEl>
-                                          <p:spTgt spid="19"/>
+                                          <p:spTgt spid="21"/>
                                         </p:tgtEl>
                                       </p:cBhvr>
                                     </p:animEffect>
@@ -6672,7 +6769,7 @@
                                           </p:stCondLst>
                                         </p:cTn>
                                         <p:tgtEl>
-                                          <p:spTgt spid="20"/>
+                                          <p:spTgt spid="19"/>
                                         </p:tgtEl>
                                         <p:attrNameLst>
                                           <p:attrName>style.visibility</p:attrName>
@@ -6685,6 +6782,41 @@
                                     <p:animEffect transition="in" filter="fade">
                                       <p:cBhvr>
                                         <p:cTn id="39" dur="500"/>
+                                        <p:tgtEl>
+                                          <p:spTgt spid="19"/>
+                                        </p:tgtEl>
+                                      </p:cBhvr>
+                                    </p:animEffect>
+                                  </p:childTnLst>
+                                </p:cTn>
+                              </p:par>
+                              <p:par>
+                                <p:cTn id="40" presetID="10" presetClass="entr" presetSubtype="0" fill="hold" nodeType="withEffect">
+                                  <p:stCondLst>
+                                    <p:cond delay="0"/>
+                                  </p:stCondLst>
+                                  <p:childTnLst>
+                                    <p:set>
+                                      <p:cBhvr>
+                                        <p:cTn id="41" dur="1" fill="hold">
+                                          <p:stCondLst>
+                                            <p:cond delay="0"/>
+                                          </p:stCondLst>
+                                        </p:cTn>
+                                        <p:tgtEl>
+                                          <p:spTgt spid="20"/>
+                                        </p:tgtEl>
+                                        <p:attrNameLst>
+                                          <p:attrName>style.visibility</p:attrName>
+                                        </p:attrNameLst>
+                                      </p:cBhvr>
+                                      <p:to>
+                                        <p:strVal val="visible"/>
+                                      </p:to>
+                                    </p:set>
+                                    <p:animEffect transition="in" filter="fade">
+                                      <p:cBhvr>
+                                        <p:cTn id="42" dur="500"/>
                                         <p:tgtEl>
                                           <p:spTgt spid="20"/>
                                         </p:tgtEl>
@@ -6700,32 +6832,32 @@
                     </p:cTn>
                   </p:par>
                   <p:par>
-                    <p:cTn id="40" fill="hold">
+                    <p:cTn id="43" fill="hold">
                       <p:stCondLst>
                         <p:cond delay="indefinite"/>
                       </p:stCondLst>
                       <p:childTnLst>
                         <p:par>
-                          <p:cTn id="41" fill="hold">
+                          <p:cTn id="44" fill="hold">
                             <p:stCondLst>
                               <p:cond delay="0"/>
                             </p:stCondLst>
                             <p:childTnLst>
                               <p:par>
-                                <p:cTn id="42" presetID="10" presetClass="entr" presetSubtype="0" fill="hold" nodeType="clickEffect">
+                                <p:cTn id="45" presetID="10" presetClass="entr" presetSubtype="0" fill="hold" grpId="0" nodeType="clickEffect">
                                   <p:stCondLst>
                                     <p:cond delay="0"/>
                                   </p:stCondLst>
                                   <p:childTnLst>
                                     <p:set>
                                       <p:cBhvr>
-                                        <p:cTn id="43" dur="1" fill="hold">
+                                        <p:cTn id="46" dur="1" fill="hold">
                                           <p:stCondLst>
                                             <p:cond delay="0"/>
                                           </p:stCondLst>
                                         </p:cTn>
                                         <p:tgtEl>
-                                          <p:spTgt spid="5124"/>
+                                          <p:spTgt spid="24"/>
                                         </p:tgtEl>
                                         <p:attrNameLst>
                                           <p:attrName>style.visibility</p:attrName>
@@ -6737,9 +6869,9 @@
                                     </p:set>
                                     <p:animEffect transition="in" filter="fade">
                                       <p:cBhvr>
-                                        <p:cTn id="44" dur="500"/>
-                                        <p:tgtEl>
-                                          <p:spTgt spid="5124"/>
+                                        <p:cTn id="47" dur="500"/>
+                                        <p:tgtEl>
+                                          <p:spTgt spid="24"/>
                                         </p:tgtEl>
                                       </p:cBhvr>
                                     </p:animEffect>
@@ -6747,20 +6879,20 @@
                                 </p:cTn>
                               </p:par>
                               <p:par>
-                                <p:cTn id="45" presetID="10" presetClass="entr" presetSubtype="0" fill="hold" grpId="0" nodeType="withEffect">
+                                <p:cTn id="48" presetID="10" presetClass="entr" presetSubtype="0" fill="hold" nodeType="withEffect">
                                   <p:stCondLst>
                                     <p:cond delay="0"/>
                                   </p:stCondLst>
                                   <p:childTnLst>
                                     <p:set>
                                       <p:cBhvr>
-                                        <p:cTn id="46" dur="1" fill="hold">
+                                        <p:cTn id="49" dur="1" fill="hold">
                                           <p:stCondLst>
                                             <p:cond delay="0"/>
                                           </p:stCondLst>
                                         </p:cTn>
                                         <p:tgtEl>
-                                          <p:spTgt spid="24"/>
+                                          <p:spTgt spid="5124"/>
                                         </p:tgtEl>
                                         <p:attrNameLst>
                                           <p:attrName>style.visibility</p:attrName>
@@ -6772,9 +6904,9 @@
                                     </p:set>
                                     <p:animEffect transition="in" filter="fade">
                                       <p:cBhvr>
-                                        <p:cTn id="47" dur="500"/>
-                                        <p:tgtEl>
-                                          <p:spTgt spid="24"/>
+                                        <p:cTn id="50" dur="500"/>
+                                        <p:tgtEl>
+                                          <p:spTgt spid="5124"/>
                                         </p:tgtEl>
                                       </p:cBhvr>
                                     </p:animEffect>
@@ -6782,14 +6914,14 @@
                                 </p:cTn>
                               </p:par>
                               <p:par>
-                                <p:cTn id="48" presetID="10" presetClass="entr" presetSubtype="0" fill="hold" grpId="0" nodeType="withEffect">
+                                <p:cTn id="51" presetID="10" presetClass="entr" presetSubtype="0" fill="hold" grpId="0" nodeType="withEffect">
                                   <p:stCondLst>
                                     <p:cond delay="0"/>
                                   </p:stCondLst>
                                   <p:childTnLst>
                                     <p:set>
                                       <p:cBhvr>
-                                        <p:cTn id="49" dur="1" fill="hold">
+                                        <p:cTn id="52" dur="1" fill="hold">
                                           <p:stCondLst>
                                             <p:cond delay="0"/>
                                           </p:stCondLst>
@@ -6807,7 +6939,7 @@
                                     </p:set>
                                     <p:animEffect transition="in" filter="fade">
                                       <p:cBhvr>
-                                        <p:cTn id="50" dur="500"/>
+                                        <p:cTn id="53" dur="500"/>
                                         <p:tgtEl>
                                           <p:spTgt spid="25"/>
                                         </p:tgtEl>
@@ -6848,6 +6980,7 @@
       <p:bldP spid="11" grpId="0"/>
       <p:bldP spid="13" grpId="0"/>
       <p:bldP spid="14" grpId="0"/>
+      <p:bldP spid="17" grpId="0" build="allAtOnce"/>
       <p:bldP spid="21" grpId="0"/>
       <p:bldP spid="22" grpId="0"/>
       <p:bldP spid="23" grpId="0"/>

</xml_diff>